<commit_message>
now it is possible to add the same client multiple times and let him play against himself. Bombs also work
</commit_message>
<xml_diff>
--- a/doc/presentation.pptx
+++ b/doc/presentation.pptx
@@ -264,7 +264,7 @@
             <a:fld id="{108830C0-5E4B-4578-B647-DB549FBDCE8B}" type="datetimeFigureOut">
               <a:rPr lang="de-DE" sz="1200"/>
               <a:pPr/>
-              <a:t>28.10.2012</a:t>
+              <a:t>29.10.2012</a:t>
             </a:fld>
             <a:endParaRPr lang="de-DE" sz="1200"/>
           </a:p>
@@ -4185,15 +4185,7 @@
           <a:p>
             <a:r>
               <a:rPr lang="de-DE" dirty="0" smtClean="0"/>
-              <a:t>Anmeldung Opium bis </a:t>
-            </a:r>
-            <a:r>
-              <a:rPr lang="de-DE" dirty="0" smtClean="0"/>
-              <a:t>heute</a:t>
-            </a:r>
-            <a:r>
-              <a:rPr lang="de-DE" dirty="0" smtClean="0"/>
-              <a:t>!</a:t>
+              <a:t>Anmeldung Opium bis heute!</a:t>
             </a:r>
             <a:br>
               <a:rPr lang="de-DE" dirty="0" smtClean="0"/>
@@ -4475,7 +4467,6 @@
               <a:rPr lang="de-DE" dirty="0" smtClean="0"/>
               <a:t> bekannt gegeben.</a:t>
             </a:r>
-            <a:endParaRPr lang="de-DE" dirty="0" smtClean="0"/>
           </a:p>
           <a:p>
             <a:r>
@@ -4736,8 +4727,41 @@
           <a:p>
             <a:r>
               <a:rPr lang="de-DE" dirty="0" smtClean="0"/>
-              <a:t>Sie können Bomben legen, die nach 3 Zügen explodieren und Wände und andere Roboter in einer 4er Nachbarschaft der Bombe entfernen. Zerstörte Roboter haben leider verloren.</a:t>
-            </a:r>
+              <a:t>Sie können Bomben legen, die nach 3 Zügen explodieren und </a:t>
+            </a:r>
+            <a:r>
+              <a:rPr lang="de-DE" dirty="0" smtClean="0"/>
+              <a:t>Wände in </a:t>
+            </a:r>
+            <a:r>
+              <a:rPr lang="de-DE" dirty="0" smtClean="0"/>
+              <a:t>einer 4er Nachbarschaft der Bombe </a:t>
+            </a:r>
+            <a:r>
+              <a:rPr lang="de-DE" dirty="0" smtClean="0"/>
+              <a:t>zerstört</a:t>
+            </a:r>
+            <a:r>
+              <a:rPr lang="de-DE" dirty="0" smtClean="0"/>
+              <a:t>. </a:t>
+            </a:r>
+            <a:r>
+              <a:rPr lang="de-DE" dirty="0" smtClean="0"/>
+              <a:t>G</a:t>
+            </a:r>
+            <a:r>
+              <a:rPr lang="de-DE" dirty="0" smtClean="0"/>
+              <a:t>etroffenen Roboter wird die </a:t>
+            </a:r>
+            <a:r>
+              <a:rPr lang="de-DE" dirty="0" err="1" smtClean="0"/>
+              <a:t>gesammte</a:t>
+            </a:r>
+            <a:r>
+              <a:rPr lang="de-DE" dirty="0" smtClean="0"/>
+              <a:t> Batterieleistung entzogen .</a:t>
+            </a:r>
+            <a:endParaRPr lang="de-DE" dirty="0" smtClean="0"/>
           </a:p>
           <a:p>
             <a:r>
@@ -4885,7 +4909,19 @@
           <a:p>
             <a:r>
               <a:rPr lang="de-DE" dirty="0" smtClean="0"/>
-              <a:t>Der Befehl Sensordaten aufnehmen führt dazu, dass sie über die Belegung im Labyrinth um die 4er Nachbarschaft der Roboterposition vor ihrem nächsten Zug informiert werden.</a:t>
+              <a:t>Der Befehl Sensordaten aufnehmen führt dazu, dass sie über die Belegung im Labyrinth um die 4er Nachbarschaft der Roboterposition </a:t>
+            </a:r>
+            <a:r>
+              <a:rPr lang="de-DE" dirty="0" smtClean="0"/>
+              <a:t>bei </a:t>
+            </a:r>
+            <a:r>
+              <a:rPr lang="de-DE" dirty="0" smtClean="0"/>
+              <a:t>ihrem </a:t>
+            </a:r>
+            <a:r>
+              <a:rPr lang="de-DE" dirty="0" smtClean="0"/>
+              <a:t>nächsten Zug informiert werden.</a:t>
             </a:r>
             <a:endParaRPr lang="de-DE" dirty="0"/>
           </a:p>
@@ -4976,11 +5012,7 @@
           <a:p>
             <a:r>
               <a:rPr lang="de-DE" dirty="0" smtClean="0"/>
-              <a:t>R</a:t>
-            </a:r>
-            <a:r>
-              <a:rPr lang="de-DE" dirty="0" smtClean="0"/>
-              <a:t>andbedingungen</a:t>
+              <a:t>Randbedingungen</a:t>
             </a:r>
             <a:endParaRPr lang="de-DE" dirty="0"/>
           </a:p>

</xml_diff>